<commit_message>
maj ppt (manque partie technique)
</commit_message>
<xml_diff>
--- a/Pr�sentation_NUI.pptx
+++ b/Pr�sentation_NUI.pptx
@@ -852,6 +852,7 @@
           <a:p>
             <a:fld id="{7FE745BF-AED8-4079-86B5-94776AA709CD}" type="datetime1">
               <a:rPr lang="fr-FR" smtClean="0"/>
+              <a:pPr/>
               <a:t>06/12/2011</a:t>
             </a:fld>
             <a:endParaRPr lang="fr-FR" dirty="0"/>
@@ -1018,6 +1019,7 @@
           <a:p>
             <a:fld id="{8BADFC06-5AC4-476A-8FD2-54DE0E426D90}" type="datetime1">
               <a:rPr lang="fr-FR" smtClean="0"/>
+              <a:pPr/>
               <a:t>06/12/2011</a:t>
             </a:fld>
             <a:endParaRPr lang="fr-FR" dirty="0"/>
@@ -1194,6 +1196,7 @@
           <a:p>
             <a:fld id="{271E89F4-7B08-401C-94CC-1E6E90A77743}" type="datetime1">
               <a:rPr lang="fr-FR" smtClean="0"/>
+              <a:pPr/>
               <a:t>06/12/2011</a:t>
             </a:fld>
             <a:endParaRPr lang="fr-FR" dirty="0"/>
@@ -1364,6 +1367,7 @@
           <a:p>
             <a:fld id="{B8D51CD3-FD0B-4398-96D6-10844A344A7A}" type="datetime1">
               <a:rPr lang="fr-FR" smtClean="0"/>
+              <a:pPr/>
               <a:t>06/12/2011</a:t>
             </a:fld>
             <a:endParaRPr lang="fr-FR" dirty="0"/>
@@ -1820,6 +1824,7 @@
           <a:p>
             <a:fld id="{5272A46D-708F-4429-9728-C0AAA1D8ED70}" type="datetime1">
               <a:rPr lang="fr-FR" smtClean="0"/>
+              <a:pPr/>
               <a:t>06/12/2011</a:t>
             </a:fld>
             <a:endParaRPr lang="fr-FR" dirty="0"/>
@@ -2085,6 +2090,7 @@
           <a:p>
             <a:fld id="{85176319-0B46-44DD-88B8-E7F3AAD4F2DF}" type="datetime1">
               <a:rPr lang="fr-FR" smtClean="0"/>
+              <a:pPr/>
               <a:t>06/12/2011</a:t>
             </a:fld>
             <a:endParaRPr lang="fr-FR" dirty="0"/>
@@ -2460,6 +2466,7 @@
           <a:p>
             <a:fld id="{2587345E-05A6-495C-A1A1-170A1A91A394}" type="datetime1">
               <a:rPr lang="fr-FR" smtClean="0"/>
+              <a:pPr/>
               <a:t>06/12/2011</a:t>
             </a:fld>
             <a:endParaRPr lang="fr-FR" dirty="0"/>
@@ -2583,6 +2590,7 @@
           <a:p>
             <a:fld id="{172809C5-74F0-4FD7-9204-0F8A8FB1929B}" type="datetime1">
               <a:rPr lang="fr-FR" smtClean="0"/>
+              <a:pPr/>
               <a:t>06/12/2011</a:t>
             </a:fld>
             <a:endParaRPr lang="fr-FR" dirty="0"/>
@@ -2674,6 +2682,7 @@
           <a:p>
             <a:fld id="{7786A093-8429-44F1-808A-11360C2CAA55}" type="datetime1">
               <a:rPr lang="fr-FR" smtClean="0"/>
+              <a:pPr/>
               <a:t>06/12/2011</a:t>
             </a:fld>
             <a:endParaRPr lang="fr-FR" dirty="0"/>
@@ -2924,6 +2933,7 @@
           <a:p>
             <a:fld id="{FE18F5A1-6F3E-41A1-AC38-A5948C92E970}" type="datetime1">
               <a:rPr lang="fr-FR" smtClean="0"/>
+              <a:pPr/>
               <a:t>06/12/2011</a:t>
             </a:fld>
             <a:endParaRPr lang="fr-FR" dirty="0"/>
@@ -3184,6 +3194,7 @@
           <a:p>
             <a:fld id="{42D0C6D8-1219-406E-8CD6-FA778B9D3E63}" type="datetime1">
               <a:rPr lang="fr-FR" smtClean="0"/>
+              <a:pPr/>
               <a:t>06/12/2011</a:t>
             </a:fld>
             <a:endParaRPr lang="fr-FR" dirty="0"/>
@@ -3589,6 +3600,7 @@
           <a:p>
             <a:fld id="{CC7C295D-0E21-434D-B466-C466C8EF3B27}" type="datetime1">
               <a:rPr lang="fr-FR" smtClean="0"/>
+              <a:pPr/>
               <a:t>06/12/2011</a:t>
             </a:fld>
             <a:endParaRPr lang="fr-FR" dirty="0"/>
@@ -4039,7 +4051,15 @@
           <a:p>
             <a:r>
               <a:rPr lang="fr-FR" dirty="0" smtClean="0"/>
-              <a:t>LUCCIN Karim – LUONG Kevin</a:t>
+              <a:t>LUCCIN </a:t>
+            </a:r>
+            <a:r>
+              <a:rPr lang="fr-FR" dirty="0" smtClean="0"/>
+              <a:t>Karim – LUONG </a:t>
+            </a:r>
+            <a:r>
+              <a:rPr lang="fr-FR" dirty="0" smtClean="0"/>
+              <a:t>Kevin</a:t>
             </a:r>
             <a:endParaRPr lang="fr-FR" dirty="0" smtClean="0"/>
           </a:p>
@@ -4366,7 +4386,6 @@
               <a:rPr lang="en-US" dirty="0" smtClean="0"/>
               <a:t>Games</a:t>
             </a:r>
-            <a:endParaRPr lang="en-US" dirty="0" smtClean="0"/>
           </a:p>
           <a:p>
             <a:pPr lvl="1"/>
@@ -4542,15 +4561,7 @@
           <a:p>
             <a:r>
               <a:rPr lang="en-US" dirty="0" smtClean="0"/>
-              <a:t>N</a:t>
-            </a:r>
-            <a:r>
-              <a:rPr lang="en-US" dirty="0" smtClean="0"/>
-              <a:t>obody </a:t>
-            </a:r>
-            <a:r>
-              <a:rPr lang="en-US" dirty="0" smtClean="0"/>
-              <a:t>uses the Kinect as a camera but only as a gaming device</a:t>
+              <a:t>Nobody uses the Kinect as a camera but only as a gaming device</a:t>
             </a:r>
           </a:p>
         </p:txBody>
@@ -4798,8 +4809,17 @@
             </a:pPr>
             <a:r>
               <a:rPr lang="en-US" dirty="0" smtClean="0"/>
-              <a:t>(screen skeleton)</a:t>
-            </a:r>
+              <a:t>(screen </a:t>
+            </a:r>
+            <a:r>
+              <a:rPr lang="en-US" dirty="0" smtClean="0"/>
+              <a:t>skeleton </a:t>
+            </a:r>
+            <a:r>
+              <a:rPr lang="en-US" smtClean="0"/>
+              <a:t>assis)</a:t>
+            </a:r>
+            <a:endParaRPr lang="en-US" dirty="0" smtClean="0"/>
           </a:p>
           <a:p>
             <a:r>
@@ -4904,11 +4924,7 @@
           <a:p>
             <a:r>
               <a:rPr lang="en-US" dirty="0" smtClean="0"/>
-              <a:t>Hand/movement </a:t>
-            </a:r>
-            <a:r>
-              <a:rPr lang="en-US" dirty="0" smtClean="0"/>
-              <a:t>recognition</a:t>
+              <a:t>Hand/movement recognition</a:t>
             </a:r>
           </a:p>
           <a:p>
@@ -5020,11 +5036,7 @@
             </a:pPr>
             <a:r>
               <a:rPr lang="en-US" dirty="0" smtClean="0"/>
-              <a:t>	Screens debug </a:t>
-            </a:r>
-            <a:r>
-              <a:rPr lang="en-US" dirty="0" smtClean="0"/>
-              <a:t>output</a:t>
+              <a:t>	Screens debug output</a:t>
             </a:r>
           </a:p>
           <a:p>
@@ -5144,11 +5156,7 @@
           <a:p>
             <a:r>
               <a:rPr lang="en-US" dirty="0" smtClean="0"/>
-              <a:t>Demo Web </a:t>
-            </a:r>
-            <a:r>
-              <a:rPr lang="en-US" dirty="0" smtClean="0"/>
-              <a:t>browser</a:t>
+              <a:t>Demo Web browser</a:t>
             </a:r>
             <a:endParaRPr lang="en-US" dirty="0"/>
           </a:p>

</xml_diff>